<commit_message>
latest files with sqlite download
</commit_message>
<xml_diff>
--- a/Introduction to Databases and SQL.pptx
+++ b/Introduction to Databases and SQL.pptx
@@ -48,6 +48,12 @@
     <p:sldId id="297" r:id="rId42"/>
     <p:sldId id="298" r:id="rId43"/>
     <p:sldId id="299" r:id="rId44"/>
+    <p:sldId id="300" r:id="rId45"/>
+    <p:sldId id="301" r:id="rId46"/>
+    <p:sldId id="302" r:id="rId47"/>
+    <p:sldId id="303" r:id="rId48"/>
+    <p:sldId id="304" r:id="rId49"/>
+    <p:sldId id="305" r:id="rId50"/>
   </p:sldIdLst>
   <p:sldSz cx="9144000" cy="6858000" type="screen4x3"/>
   <p:notesSz cx="6858000" cy="9144000"/>
@@ -330,7 +336,7 @@
           <a:p>
             <a:fld id="{4868E424-B0E7-4195-8E52-EB1FBE2B7F95}" type="datetimeFigureOut">
               <a:rPr lang="en-US" smtClean="0"/>
-              <a:t>5/15/2015</a:t>
+              <a:t>5/19/2015</a:t>
             </a:fld>
             <a:endParaRPr lang="en-US"/>
           </a:p>
@@ -500,7 +506,7 @@
           <a:p>
             <a:fld id="{4868E424-B0E7-4195-8E52-EB1FBE2B7F95}" type="datetimeFigureOut">
               <a:rPr lang="en-US" smtClean="0"/>
-              <a:t>5/15/2015</a:t>
+              <a:t>5/19/2015</a:t>
             </a:fld>
             <a:endParaRPr lang="en-US"/>
           </a:p>
@@ -680,7 +686,7 @@
           <a:p>
             <a:fld id="{4868E424-B0E7-4195-8E52-EB1FBE2B7F95}" type="datetimeFigureOut">
               <a:rPr lang="en-US" smtClean="0"/>
-              <a:t>5/15/2015</a:t>
+              <a:t>5/19/2015</a:t>
             </a:fld>
             <a:endParaRPr lang="en-US"/>
           </a:p>
@@ -850,7 +856,7 @@
           <a:p>
             <a:fld id="{4868E424-B0E7-4195-8E52-EB1FBE2B7F95}" type="datetimeFigureOut">
               <a:rPr lang="en-US" smtClean="0"/>
-              <a:t>5/15/2015</a:t>
+              <a:t>5/19/2015</a:t>
             </a:fld>
             <a:endParaRPr lang="en-US"/>
           </a:p>
@@ -1096,7 +1102,7 @@
           <a:p>
             <a:fld id="{4868E424-B0E7-4195-8E52-EB1FBE2B7F95}" type="datetimeFigureOut">
               <a:rPr lang="en-US" smtClean="0"/>
-              <a:t>5/15/2015</a:t>
+              <a:t>5/19/2015</a:t>
             </a:fld>
             <a:endParaRPr lang="en-US"/>
           </a:p>
@@ -1384,7 +1390,7 @@
           <a:p>
             <a:fld id="{4868E424-B0E7-4195-8E52-EB1FBE2B7F95}" type="datetimeFigureOut">
               <a:rPr lang="en-US" smtClean="0"/>
-              <a:t>5/15/2015</a:t>
+              <a:t>5/19/2015</a:t>
             </a:fld>
             <a:endParaRPr lang="en-US"/>
           </a:p>
@@ -1806,7 +1812,7 @@
           <a:p>
             <a:fld id="{4868E424-B0E7-4195-8E52-EB1FBE2B7F95}" type="datetimeFigureOut">
               <a:rPr lang="en-US" smtClean="0"/>
-              <a:t>5/15/2015</a:t>
+              <a:t>5/19/2015</a:t>
             </a:fld>
             <a:endParaRPr lang="en-US"/>
           </a:p>
@@ -1924,7 +1930,7 @@
           <a:p>
             <a:fld id="{4868E424-B0E7-4195-8E52-EB1FBE2B7F95}" type="datetimeFigureOut">
               <a:rPr lang="en-US" smtClean="0"/>
-              <a:t>5/15/2015</a:t>
+              <a:t>5/19/2015</a:t>
             </a:fld>
             <a:endParaRPr lang="en-US"/>
           </a:p>
@@ -2019,7 +2025,7 @@
           <a:p>
             <a:fld id="{4868E424-B0E7-4195-8E52-EB1FBE2B7F95}" type="datetimeFigureOut">
               <a:rPr lang="en-US" smtClean="0"/>
-              <a:t>5/15/2015</a:t>
+              <a:t>5/19/2015</a:t>
             </a:fld>
             <a:endParaRPr lang="en-US"/>
           </a:p>
@@ -2296,7 +2302,7 @@
           <a:p>
             <a:fld id="{4868E424-B0E7-4195-8E52-EB1FBE2B7F95}" type="datetimeFigureOut">
               <a:rPr lang="en-US" smtClean="0"/>
-              <a:t>5/15/2015</a:t>
+              <a:t>5/19/2015</a:t>
             </a:fld>
             <a:endParaRPr lang="en-US"/>
           </a:p>
@@ -2549,7 +2555,7 @@
           <a:p>
             <a:fld id="{4868E424-B0E7-4195-8E52-EB1FBE2B7F95}" type="datetimeFigureOut">
               <a:rPr lang="en-US" smtClean="0"/>
-              <a:t>5/15/2015</a:t>
+              <a:t>5/19/2015</a:t>
             </a:fld>
             <a:endParaRPr lang="en-US"/>
           </a:p>
@@ -2762,7 +2768,7 @@
           <a:p>
             <a:fld id="{4868E424-B0E7-4195-8E52-EB1FBE2B7F95}" type="datetimeFigureOut">
               <a:rPr lang="en-US" smtClean="0"/>
-              <a:t>5/15/2015</a:t>
+              <a:t>5/19/2015</a:t>
             </a:fld>
             <a:endParaRPr lang="en-US"/>
           </a:p>
@@ -3243,7 +3249,6 @@
               <a:rPr lang="en-US" dirty="0"/>
               <a:t>7. Never draw more in the morning than you can erase in the afternoon.</a:t>
             </a:r>
-            <a:endParaRPr lang="en-US" dirty="0"/>
           </a:p>
         </p:txBody>
       </p:sp>
@@ -18854,13 +18859,8 @@
             <a:pPr lvl="1"/>
             <a:r>
               <a:rPr lang="en-US" dirty="0" smtClean="0"/>
-              <a:t>Many </a:t>
+              <a:t>Many things</a:t>
             </a:r>
-            <a:r>
-              <a:rPr lang="en-US" dirty="0" smtClean="0"/>
-              <a:t>things</a:t>
-            </a:r>
-            <a:endParaRPr lang="en-US" dirty="0" smtClean="0"/>
           </a:p>
           <a:p>
             <a:pPr marL="57150" indent="0">
@@ -37695,11 +37695,7 @@
             </a:r>
             <a:r>
               <a:rPr lang="en-US" dirty="0" smtClean="0"/>
-              <a:t> Odd </a:t>
-            </a:r>
-            <a:r>
-              <a:rPr lang="en-US" dirty="0" smtClean="0"/>
-              <a:t>Rules Continued</a:t>
+              <a:t> Odd Rules Continued</a:t>
             </a:r>
             <a:endParaRPr lang="en-US" dirty="0"/>
           </a:p>
@@ -38452,11 +38448,6 @@
               </a:rPr>
               <a:t>Get all columns</a:t>
             </a:r>
-            <a:endParaRPr lang="en-US" i="1" dirty="0" smtClean="0">
-              <a:solidFill>
-                <a:srgbClr val="00B050"/>
-              </a:solidFill>
-            </a:endParaRPr>
           </a:p>
         </p:txBody>
       </p:sp>
@@ -38651,11 +38642,6 @@
               </a:rPr>
               <a:t>Get only 3 columns</a:t>
             </a:r>
-            <a:endParaRPr lang="en-US" i="1" dirty="0" smtClean="0">
-              <a:solidFill>
-                <a:srgbClr val="00B050"/>
-              </a:solidFill>
-            </a:endParaRPr>
           </a:p>
         </p:txBody>
       </p:sp>
@@ -38678,6 +38664,42 @@
               <a:schemeClr val="tx1"/>
             </a:solidFill>
             <a:prstDash val="dash"/>
+          </a:ln>
+        </p:spPr>
+        <p:style>
+          <a:lnRef idx="1">
+            <a:schemeClr val="accent1"/>
+          </a:lnRef>
+          <a:fillRef idx="0">
+            <a:schemeClr val="accent1"/>
+          </a:fillRef>
+          <a:effectRef idx="0">
+            <a:schemeClr val="accent1"/>
+          </a:effectRef>
+          <a:fontRef idx="minor">
+            <a:schemeClr val="tx1"/>
+          </a:fontRef>
+        </p:style>
+      </p:cxnSp>
+      <p:cxnSp>
+        <p:nvCxnSpPr>
+          <p:cNvPr id="8" name="Straight Connector 7"/>
+          <p:cNvCxnSpPr/>
+          <p:nvPr/>
+        </p:nvCxnSpPr>
+        <p:spPr>
+          <a:xfrm>
+            <a:off x="452063" y="2819400"/>
+            <a:ext cx="8387137" cy="0"/>
+          </a:xfrm>
+          <a:prstGeom prst="line">
+            <a:avLst/>
+          </a:prstGeom>
+          <a:ln w="76200" cmpd="dbl">
+            <a:solidFill>
+              <a:schemeClr val="tx1"/>
+            </a:solidFill>
+            <a:prstDash val="solid"/>
           </a:ln>
         </p:spPr>
         <p:style>
@@ -38984,11 +39006,6 @@
               </a:rPr>
               <a:t>Rooms table</a:t>
             </a:r>
-            <a:endParaRPr lang="en-US" i="1" dirty="0" smtClean="0">
-              <a:solidFill>
-                <a:srgbClr val="00B050"/>
-              </a:solidFill>
-            </a:endParaRPr>
           </a:p>
         </p:txBody>
       </p:sp>
@@ -39173,11 +39190,6 @@
               </a:rPr>
               <a:t>Boxes table</a:t>
             </a:r>
-            <a:endParaRPr lang="en-US" i="1" dirty="0" smtClean="0">
-              <a:solidFill>
-                <a:srgbClr val="00B050"/>
-              </a:solidFill>
-            </a:endParaRPr>
           </a:p>
         </p:txBody>
       </p:sp>
@@ -39362,11 +39374,6 @@
               </a:rPr>
               <a:t>Items table</a:t>
             </a:r>
-            <a:endParaRPr lang="en-US" i="1" dirty="0" smtClean="0">
-              <a:solidFill>
-                <a:srgbClr val="00B050"/>
-              </a:solidFill>
-            </a:endParaRPr>
           </a:p>
         </p:txBody>
       </p:sp>
@@ -39425,6 +39432,42 @@
               <a:schemeClr val="tx1"/>
             </a:solidFill>
             <a:prstDash val="dash"/>
+          </a:ln>
+        </p:spPr>
+        <p:style>
+          <a:lnRef idx="1">
+            <a:schemeClr val="accent1"/>
+          </a:lnRef>
+          <a:fillRef idx="0">
+            <a:schemeClr val="accent1"/>
+          </a:fillRef>
+          <a:effectRef idx="0">
+            <a:schemeClr val="accent1"/>
+          </a:effectRef>
+          <a:fontRef idx="minor">
+            <a:schemeClr val="tx1"/>
+          </a:fontRef>
+        </p:style>
+      </p:cxnSp>
+      <p:cxnSp>
+        <p:nvCxnSpPr>
+          <p:cNvPr id="9" name="Straight Connector 8"/>
+          <p:cNvCxnSpPr/>
+          <p:nvPr/>
+        </p:nvCxnSpPr>
+        <p:spPr>
+          <a:xfrm>
+            <a:off x="401516" y="2438400"/>
+            <a:ext cx="8387137" cy="0"/>
+          </a:xfrm>
+          <a:prstGeom prst="line">
+            <a:avLst/>
+          </a:prstGeom>
+          <a:ln w="76200" cmpd="dbl">
+            <a:solidFill>
+              <a:schemeClr val="tx1"/>
+            </a:solidFill>
+            <a:prstDash val="solid"/>
           </a:ln>
         </p:spPr>
         <p:style>
@@ -39560,8 +39603,8 @@
         </p:nvSpPr>
         <p:spPr>
           <a:xfrm>
-            <a:off x="381000" y="2057400"/>
-            <a:ext cx="8229600" cy="1295400"/>
+            <a:off x="236623" y="2206978"/>
+            <a:ext cx="4267200" cy="1295400"/>
           </a:xfrm>
           <a:prstGeom prst="rect">
             <a:avLst/>
@@ -39569,7 +39612,7 @@
         </p:spPr>
         <p:txBody>
           <a:bodyPr vert="horz" lIns="91440" tIns="45720" rIns="91440" bIns="45720" rtlCol="0">
-            <a:normAutofit/>
+            <a:normAutofit fontScale="92500" lnSpcReduction="20000"/>
           </a:bodyPr>
           <a:lstStyle>
             <a:lvl1pPr marL="342900" indent="-342900" algn="l" defTabSz="914400" rtl="0" eaLnBrk="1" latinLnBrk="0" hangingPunct="1">
@@ -39714,7 +39757,7 @@
             </a:pPr>
             <a:r>
               <a:rPr lang="en-US" dirty="0" smtClean="0"/>
-              <a:t>WHERE Room = ’Closet’</a:t>
+              <a:t>WHERE Item = ’Books’</a:t>
             </a:r>
           </a:p>
           <a:p>
@@ -39728,13 +39771,8 @@
                   <a:srgbClr val="00B050"/>
                 </a:solidFill>
               </a:rPr>
-              <a:t>Only get rows where the room equals closet</a:t>
+              <a:t>Only get rows where the Item is Books</a:t>
             </a:r>
-            <a:endParaRPr lang="en-US" i="1" dirty="0" smtClean="0">
-              <a:solidFill>
-                <a:srgbClr val="00B050"/>
-              </a:solidFill>
-            </a:endParaRPr>
           </a:p>
         </p:txBody>
       </p:sp>
@@ -39748,8 +39786,8 @@
         </p:nvSpPr>
         <p:spPr>
           <a:xfrm>
-            <a:off x="366445" y="3352800"/>
-            <a:ext cx="8229600" cy="1295400"/>
+            <a:off x="4554369" y="2209800"/>
+            <a:ext cx="4137378" cy="1828800"/>
           </a:xfrm>
           <a:prstGeom prst="rect">
             <a:avLst/>
@@ -39757,7 +39795,7 @@
         </p:spPr>
         <p:txBody>
           <a:bodyPr vert="horz" lIns="91440" tIns="45720" rIns="91440" bIns="45720" rtlCol="0">
-            <a:normAutofit/>
+            <a:normAutofit fontScale="92500" lnSpcReduction="10000"/>
           </a:bodyPr>
           <a:lstStyle>
             <a:lvl1pPr marL="342900" indent="-342900" algn="l" defTabSz="914400" rtl="0" eaLnBrk="1" latinLnBrk="0" hangingPunct="1">
@@ -39906,7 +39944,7 @@
             </a:r>
             <a:r>
               <a:rPr lang="en-US" dirty="0" err="1" smtClean="0"/>
-              <a:t>RoomID</a:t>
+              <a:t>ItemID</a:t>
             </a:r>
             <a:r>
               <a:rPr lang="en-US" dirty="0" smtClean="0"/>
@@ -39915,7 +39953,6 @@
           </a:p>
           <a:p>
             <a:pPr marL="0" indent="0">
-              <a:buFont typeface="Arial" panose="020B0604020202020204" pitchFamily="34" charset="0"/>
               <a:buNone/>
             </a:pPr>
             <a:r>
@@ -39924,16 +39961,99 @@
                   <a:srgbClr val="00B050"/>
                 </a:solidFill>
               </a:rPr>
-              <a:t>Only get rows based on the value of the room ID</a:t>
+              <a:t>Only get rows </a:t>
             </a:r>
-            <a:endParaRPr lang="en-US" i="1" dirty="0" smtClean="0">
-              <a:solidFill>
-                <a:srgbClr val="00B050"/>
-              </a:solidFill>
-            </a:endParaRPr>
+            <a:r>
+              <a:rPr lang="en-US" i="1" dirty="0">
+                <a:solidFill>
+                  <a:srgbClr val="00B050"/>
+                </a:solidFill>
+              </a:rPr>
+              <a:t>where the </a:t>
+            </a:r>
+            <a:r>
+              <a:rPr lang="en-US" i="1" dirty="0" smtClean="0">
+                <a:solidFill>
+                  <a:srgbClr val="00B050"/>
+                </a:solidFill>
+              </a:rPr>
+              <a:t>value of the Item ID is greater than or equal to</a:t>
+            </a:r>
           </a:p>
         </p:txBody>
       </p:sp>
+      <p:cxnSp>
+        <p:nvCxnSpPr>
+          <p:cNvPr id="6" name="Straight Connector 5"/>
+          <p:cNvCxnSpPr/>
+          <p:nvPr/>
+        </p:nvCxnSpPr>
+        <p:spPr>
+          <a:xfrm>
+            <a:off x="366445" y="2032000"/>
+            <a:ext cx="8387137" cy="0"/>
+          </a:xfrm>
+          <a:prstGeom prst="line">
+            <a:avLst/>
+          </a:prstGeom>
+          <a:ln w="76200" cmpd="dbl">
+            <a:solidFill>
+              <a:schemeClr val="tx1"/>
+            </a:solidFill>
+            <a:prstDash val="solid"/>
+          </a:ln>
+        </p:spPr>
+        <p:style>
+          <a:lnRef idx="1">
+            <a:schemeClr val="accent1"/>
+          </a:lnRef>
+          <a:fillRef idx="0">
+            <a:schemeClr val="accent1"/>
+          </a:fillRef>
+          <a:effectRef idx="0">
+            <a:schemeClr val="accent1"/>
+          </a:effectRef>
+          <a:fontRef idx="minor">
+            <a:schemeClr val="tx1"/>
+          </a:fontRef>
+        </p:style>
+      </p:cxnSp>
+      <p:cxnSp>
+        <p:nvCxnSpPr>
+          <p:cNvPr id="7" name="Straight Connector 6"/>
+          <p:cNvCxnSpPr/>
+          <p:nvPr/>
+        </p:nvCxnSpPr>
+        <p:spPr>
+          <a:xfrm>
+            <a:off x="4343400" y="2133600"/>
+            <a:ext cx="0" cy="1905000"/>
+          </a:xfrm>
+          <a:prstGeom prst="line">
+            <a:avLst/>
+          </a:prstGeom>
+          <a:ln w="25400">
+            <a:solidFill>
+              <a:schemeClr val="tx1"/>
+            </a:solidFill>
+            <a:prstDash val="dash"/>
+          </a:ln>
+        </p:spPr>
+        <p:style>
+          <a:lnRef idx="1">
+            <a:schemeClr val="accent1"/>
+          </a:lnRef>
+          <a:fillRef idx="0">
+            <a:schemeClr val="accent1"/>
+          </a:fillRef>
+          <a:effectRef idx="0">
+            <a:schemeClr val="accent1"/>
+          </a:effectRef>
+          <a:fontRef idx="minor">
+            <a:schemeClr val="tx1"/>
+          </a:fontRef>
+        </p:style>
+      </p:cxnSp>
     </p:spTree>
     <p:extLst>
       <p:ext uri="{BB962C8B-B14F-4D97-AF65-F5344CB8AC3E}">
@@ -40085,7 +40205,7 @@
         </p:nvSpPr>
         <p:spPr>
           <a:xfrm>
-            <a:off x="394447" y="3200400"/>
+            <a:off x="377514" y="3332183"/>
             <a:ext cx="2805953" cy="1295399"/>
           </a:xfrm>
           <a:prstGeom prst="rect">
@@ -40240,7 +40360,7 @@
             </a:pPr>
             <a:r>
               <a:rPr lang="en-US" dirty="0" smtClean="0"/>
-              <a:t>ORDER BY Room</a:t>
+              <a:t>ORDER BY Item</a:t>
             </a:r>
           </a:p>
           <a:p>
@@ -40254,7 +40374,7 @@
                   <a:srgbClr val="00B050"/>
                 </a:solidFill>
               </a:rPr>
-              <a:t>Sort by the Room </a:t>
+              <a:t>Sort by the Item </a:t>
             </a:r>
           </a:p>
           <a:p>
@@ -40288,7 +40408,7 @@
         </p:nvSpPr>
         <p:spPr>
           <a:xfrm>
-            <a:off x="3810000" y="3217884"/>
+            <a:off x="3807178" y="3332183"/>
             <a:ext cx="3994673" cy="1295399"/>
           </a:xfrm>
           <a:prstGeom prst="rect">
@@ -40447,7 +40567,7 @@
             </a:r>
             <a:r>
               <a:rPr lang="en-US" dirty="0" err="1" smtClean="0"/>
-              <a:t>RoomID</a:t>
+              <a:t>ItemID</a:t>
             </a:r>
             <a:r>
               <a:rPr lang="en-US" dirty="0" smtClean="0"/>
@@ -40473,7 +40593,7 @@
                   <a:srgbClr val="00B050"/>
                 </a:solidFill>
               </a:rPr>
-              <a:t>RoomID</a:t>
+              <a:t>ItemID</a:t>
             </a:r>
             <a:r>
               <a:rPr lang="en-US" i="1" dirty="0" smtClean="0">
@@ -40513,7 +40633,7 @@
         </p:nvCxnSpPr>
         <p:spPr>
           <a:xfrm>
-            <a:off x="3356225" y="3294084"/>
+            <a:off x="3356225" y="3370284"/>
             <a:ext cx="0" cy="1219199"/>
           </a:xfrm>
           <a:prstGeom prst="line">
@@ -40524,6 +40644,42 @@
               <a:schemeClr val="tx1"/>
             </a:solidFill>
             <a:prstDash val="dash"/>
+          </a:ln>
+        </p:spPr>
+        <p:style>
+          <a:lnRef idx="1">
+            <a:schemeClr val="accent1"/>
+          </a:lnRef>
+          <a:fillRef idx="0">
+            <a:schemeClr val="accent1"/>
+          </a:fillRef>
+          <a:effectRef idx="0">
+            <a:schemeClr val="accent1"/>
+          </a:effectRef>
+          <a:fontRef idx="minor">
+            <a:schemeClr val="tx1"/>
+          </a:fontRef>
+        </p:style>
+      </p:cxnSp>
+      <p:cxnSp>
+        <p:nvCxnSpPr>
+          <p:cNvPr id="8" name="Straight Connector 7"/>
+          <p:cNvCxnSpPr/>
+          <p:nvPr/>
+        </p:nvCxnSpPr>
+        <p:spPr>
+          <a:xfrm>
+            <a:off x="152400" y="3200400"/>
+            <a:ext cx="8387137" cy="0"/>
+          </a:xfrm>
+          <a:prstGeom prst="line">
+            <a:avLst/>
+          </a:prstGeom>
+          <a:ln w="76200" cmpd="dbl">
+            <a:solidFill>
+              <a:schemeClr val="tx1"/>
+            </a:solidFill>
+            <a:prstDash val="solid"/>
           </a:ln>
         </p:spPr>
         <p:style>
@@ -40558,6 +40714,1657 @@
       </p:par>
     </p:tnLst>
   </p:timing>
+</p:sld>
+</file>
+
+<file path=ppt/slides/slide44.xml><?xml version="1.0" encoding="utf-8"?>
+<p:sld xmlns:a="http://schemas.openxmlformats.org/drawingml/2006/main" xmlns:r="http://schemas.openxmlformats.org/officeDocument/2006/relationships" xmlns:p="http://schemas.openxmlformats.org/presentationml/2006/main">
+  <p:cSld>
+    <p:spTree>
+      <p:nvGrpSpPr>
+        <p:cNvPr id="1" name=""/>
+        <p:cNvGrpSpPr/>
+        <p:nvPr/>
+      </p:nvGrpSpPr>
+      <p:grpSpPr>
+        <a:xfrm>
+          <a:off x="0" y="0"/>
+          <a:ext cx="0" cy="0"/>
+          <a:chOff x="0" y="0"/>
+          <a:chExt cx="0" cy="0"/>
+        </a:xfrm>
+      </p:grpSpPr>
+      <p:sp>
+        <p:nvSpPr>
+          <p:cNvPr id="2" name="Title 1"/>
+          <p:cNvSpPr>
+            <a:spLocks noGrp="1"/>
+          </p:cNvSpPr>
+          <p:nvPr>
+            <p:ph type="title"/>
+          </p:nvPr>
+        </p:nvSpPr>
+        <p:spPr>
+          <a:xfrm>
+            <a:off x="457200" y="0"/>
+            <a:ext cx="8229600" cy="1143000"/>
+          </a:xfrm>
+        </p:spPr>
+        <p:txBody>
+          <a:bodyPr/>
+          <a:lstStyle/>
+          <a:p>
+            <a:r>
+              <a:rPr lang="en-US" dirty="0" smtClean="0"/>
+              <a:t>Time to Play!</a:t>
+            </a:r>
+            <a:endParaRPr lang="en-US" dirty="0"/>
+          </a:p>
+        </p:txBody>
+      </p:sp>
+      <p:sp>
+        <p:nvSpPr>
+          <p:cNvPr id="3" name="Content Placeholder 2"/>
+          <p:cNvSpPr>
+            <a:spLocks noGrp="1"/>
+          </p:cNvSpPr>
+          <p:nvPr>
+            <p:ph idx="1"/>
+          </p:nvPr>
+        </p:nvSpPr>
+        <p:spPr>
+          <a:xfrm>
+            <a:off x="453613" y="914400"/>
+            <a:ext cx="8229600" cy="4525963"/>
+          </a:xfrm>
+        </p:spPr>
+        <p:txBody>
+          <a:bodyPr/>
+          <a:lstStyle/>
+          <a:p>
+            <a:pPr marL="0" indent="0" algn="ctr">
+              <a:buNone/>
+            </a:pPr>
+            <a:r>
+              <a:rPr lang="en-US" sz="4400" b="1" dirty="0" smtClean="0">
+                <a:solidFill>
+                  <a:srgbClr val="7030A0"/>
+                </a:solidFill>
+              </a:rPr>
+              <a:t>Open sqlite3</a:t>
+            </a:r>
+          </a:p>
+          <a:p>
+            <a:pPr marL="0" indent="0">
+              <a:buNone/>
+            </a:pPr>
+            <a:endParaRPr lang="en-US" dirty="0"/>
+          </a:p>
+        </p:txBody>
+      </p:sp>
+      <p:pic>
+        <p:nvPicPr>
+          <p:cNvPr id="1026" name="Picture 2"/>
+          <p:cNvPicPr>
+            <a:picLocks noChangeAspect="1" noChangeArrowheads="1"/>
+          </p:cNvPicPr>
+          <p:nvPr/>
+        </p:nvPicPr>
+        <p:blipFill>
+          <a:blip r:embed="rId2">
+            <a:extLst>
+              <a:ext uri="{28A0092B-C50C-407E-A947-70E740481C1C}">
+                <a14:useLocalDpi xmlns:a14="http://schemas.microsoft.com/office/drawing/2010/main" val="0"/>
+              </a:ext>
+            </a:extLst>
+          </a:blip>
+          <a:srcRect/>
+          <a:stretch>
+            <a:fillRect/>
+          </a:stretch>
+        </p:blipFill>
+        <p:spPr bwMode="auto">
+          <a:xfrm>
+            <a:off x="14111" y="1676400"/>
+            <a:ext cx="9108604" cy="2139244"/>
+          </a:xfrm>
+          <a:prstGeom prst="rect">
+            <a:avLst/>
+          </a:prstGeom>
+          <a:noFill/>
+          <a:ln>
+            <a:noFill/>
+          </a:ln>
+          <a:extLst>
+            <a:ext uri="{909E8E84-426E-40DD-AFC4-6F175D3DCCD1}">
+              <a14:hiddenFill xmlns:a14="http://schemas.microsoft.com/office/drawing/2010/main">
+                <a:solidFill>
+                  <a:schemeClr val="accent1"/>
+                </a:solidFill>
+              </a14:hiddenFill>
+            </a:ext>
+            <a:ext uri="{91240B29-F687-4F45-9708-019B960494DF}">
+              <a14:hiddenLine xmlns:a14="http://schemas.microsoft.com/office/drawing/2010/main" w="9525">
+                <a:solidFill>
+                  <a:schemeClr val="tx1"/>
+                </a:solidFill>
+                <a:miter lim="800000"/>
+                <a:headEnd/>
+                <a:tailEnd/>
+              </a14:hiddenLine>
+            </a:ext>
+          </a:extLst>
+        </p:spPr>
+      </p:pic>
+    </p:spTree>
+    <p:extLst>
+      <p:ext uri="{BB962C8B-B14F-4D97-AF65-F5344CB8AC3E}">
+        <p14:creationId xmlns:p14="http://schemas.microsoft.com/office/powerpoint/2010/main" val="4191878504"/>
+      </p:ext>
+    </p:extLst>
+  </p:cSld>
+  <p:clrMapOvr>
+    <a:masterClrMapping/>
+  </p:clrMapOvr>
+</p:sld>
+</file>
+
+<file path=ppt/slides/slide45.xml><?xml version="1.0" encoding="utf-8"?>
+<p:sld xmlns:a="http://schemas.openxmlformats.org/drawingml/2006/main" xmlns:r="http://schemas.openxmlformats.org/officeDocument/2006/relationships" xmlns:p="http://schemas.openxmlformats.org/presentationml/2006/main">
+  <p:cSld>
+    <p:spTree>
+      <p:nvGrpSpPr>
+        <p:cNvPr id="1" name=""/>
+        <p:cNvGrpSpPr/>
+        <p:nvPr/>
+      </p:nvGrpSpPr>
+      <p:grpSpPr>
+        <a:xfrm>
+          <a:off x="0" y="0"/>
+          <a:ext cx="0" cy="0"/>
+          <a:chOff x="0" y="0"/>
+          <a:chExt cx="0" cy="0"/>
+        </a:xfrm>
+      </p:grpSpPr>
+      <p:sp>
+        <p:nvSpPr>
+          <p:cNvPr id="2" name="Title 1"/>
+          <p:cNvSpPr>
+            <a:spLocks noGrp="1"/>
+          </p:cNvSpPr>
+          <p:nvPr>
+            <p:ph type="title"/>
+          </p:nvPr>
+        </p:nvSpPr>
+        <p:spPr>
+          <a:xfrm>
+            <a:off x="457200" y="0"/>
+            <a:ext cx="8229600" cy="1143000"/>
+          </a:xfrm>
+        </p:spPr>
+        <p:txBody>
+          <a:bodyPr/>
+          <a:lstStyle/>
+          <a:p>
+            <a:r>
+              <a:rPr lang="en-US" dirty="0" err="1" smtClean="0"/>
+              <a:t>Sqlite</a:t>
+            </a:r>
+            <a:r>
+              <a:rPr lang="en-US" dirty="0" smtClean="0"/>
+              <a:t> housekeeping</a:t>
+            </a:r>
+            <a:endParaRPr lang="en-US" dirty="0"/>
+          </a:p>
+        </p:txBody>
+      </p:sp>
+      <p:sp>
+        <p:nvSpPr>
+          <p:cNvPr id="3" name="Content Placeholder 2"/>
+          <p:cNvSpPr>
+            <a:spLocks noGrp="1"/>
+          </p:cNvSpPr>
+          <p:nvPr>
+            <p:ph idx="1"/>
+          </p:nvPr>
+        </p:nvSpPr>
+        <p:spPr>
+          <a:xfrm>
+            <a:off x="381000" y="914400"/>
+            <a:ext cx="8229600" cy="4525963"/>
+          </a:xfrm>
+        </p:spPr>
+        <p:txBody>
+          <a:bodyPr/>
+          <a:lstStyle/>
+          <a:p>
+            <a:pPr marL="0" indent="0">
+              <a:buNone/>
+            </a:pPr>
+            <a:r>
+              <a:rPr lang="en-US" dirty="0" err="1" smtClean="0"/>
+              <a:t>sqlite</a:t>
+            </a:r>
+            <a:r>
+              <a:rPr lang="en-US" dirty="0" smtClean="0"/>
+              <a:t>&gt; </a:t>
+            </a:r>
+            <a:r>
+              <a:rPr lang="en-US" b="1" dirty="0" smtClean="0">
+                <a:solidFill>
+                  <a:srgbClr val="7030A0"/>
+                </a:solidFill>
+              </a:rPr>
+              <a:t>.</a:t>
+            </a:r>
+            <a:r>
+              <a:rPr lang="en-US" b="1" dirty="0" smtClean="0">
+                <a:solidFill>
+                  <a:srgbClr val="7030A0"/>
+                </a:solidFill>
+              </a:rPr>
+              <a:t>header on</a:t>
+            </a:r>
+          </a:p>
+          <a:p>
+            <a:pPr marL="0" indent="0">
+              <a:buNone/>
+            </a:pPr>
+            <a:r>
+              <a:rPr lang="en-US" dirty="0" err="1" smtClean="0"/>
+              <a:t>sqlite</a:t>
+            </a:r>
+            <a:r>
+              <a:rPr lang="en-US" dirty="0" smtClean="0"/>
+              <a:t>&gt; </a:t>
+            </a:r>
+            <a:r>
+              <a:rPr lang="en-US" b="1" dirty="0" smtClean="0">
+                <a:solidFill>
+                  <a:srgbClr val="7030A0"/>
+                </a:solidFill>
+              </a:rPr>
+              <a:t>.</a:t>
+            </a:r>
+            <a:r>
+              <a:rPr lang="en-US" b="1" dirty="0" smtClean="0">
+                <a:solidFill>
+                  <a:srgbClr val="7030A0"/>
+                </a:solidFill>
+              </a:rPr>
+              <a:t>mode </a:t>
+            </a:r>
+            <a:r>
+              <a:rPr lang="en-US" b="1" dirty="0" smtClean="0">
+                <a:solidFill>
+                  <a:srgbClr val="7030A0"/>
+                </a:solidFill>
+              </a:rPr>
+              <a:t>column</a:t>
+            </a:r>
+          </a:p>
+          <a:p>
+            <a:pPr marL="0" indent="0">
+              <a:buNone/>
+            </a:pPr>
+            <a:r>
+              <a:rPr lang="en-US" dirty="0" err="1"/>
+              <a:t>sqlite</a:t>
+            </a:r>
+            <a:r>
+              <a:rPr lang="en-US" dirty="0" smtClean="0"/>
+              <a:t>&gt; </a:t>
+            </a:r>
+            <a:r>
+              <a:rPr lang="en-US" b="1" dirty="0" smtClean="0">
+                <a:solidFill>
+                  <a:srgbClr val="7030A0"/>
+                </a:solidFill>
+              </a:rPr>
+              <a:t>.open &lt;path&gt;GDIDB1</a:t>
+            </a:r>
+          </a:p>
+          <a:p>
+            <a:pPr marL="0" indent="0">
+              <a:buNone/>
+            </a:pPr>
+            <a:r>
+              <a:rPr lang="en-US" dirty="0" err="1"/>
+              <a:t>sqlite</a:t>
+            </a:r>
+            <a:r>
+              <a:rPr lang="en-US" dirty="0"/>
+              <a:t>&gt; </a:t>
+            </a:r>
+            <a:r>
+              <a:rPr lang="en-US" b="1" dirty="0" smtClean="0">
+                <a:solidFill>
+                  <a:srgbClr val="7030A0"/>
+                </a:solidFill>
+              </a:rPr>
+              <a:t>.schema</a:t>
+            </a:r>
+            <a:endParaRPr lang="en-US" b="1" dirty="0">
+              <a:solidFill>
+                <a:srgbClr val="7030A0"/>
+              </a:solidFill>
+            </a:endParaRPr>
+          </a:p>
+          <a:p>
+            <a:pPr marL="0" indent="0">
+              <a:buNone/>
+            </a:pPr>
+            <a:endParaRPr lang="en-US" b="1" dirty="0" smtClean="0">
+              <a:solidFill>
+                <a:srgbClr val="7030A0"/>
+              </a:solidFill>
+            </a:endParaRPr>
+          </a:p>
+          <a:p>
+            <a:pPr marL="0" indent="0">
+              <a:buNone/>
+            </a:pPr>
+            <a:endParaRPr lang="en-US" b="1" dirty="0" smtClean="0">
+              <a:solidFill>
+                <a:srgbClr val="7030A0"/>
+              </a:solidFill>
+            </a:endParaRPr>
+          </a:p>
+          <a:p>
+            <a:pPr marL="0" indent="0">
+              <a:buNone/>
+            </a:pPr>
+            <a:endParaRPr lang="en-US" dirty="0"/>
+          </a:p>
+        </p:txBody>
+      </p:sp>
+      <p:pic>
+        <p:nvPicPr>
+          <p:cNvPr id="1029" name="Picture 5"/>
+          <p:cNvPicPr>
+            <a:picLocks noChangeAspect="1" noChangeArrowheads="1"/>
+          </p:cNvPicPr>
+          <p:nvPr/>
+        </p:nvPicPr>
+        <p:blipFill>
+          <a:blip r:embed="rId2">
+            <a:extLst>
+              <a:ext uri="{28A0092B-C50C-407E-A947-70E740481C1C}">
+                <a14:useLocalDpi xmlns:a14="http://schemas.microsoft.com/office/drawing/2010/main" val="0"/>
+              </a:ext>
+            </a:extLst>
+          </a:blip>
+          <a:srcRect/>
+          <a:stretch>
+            <a:fillRect/>
+          </a:stretch>
+        </p:blipFill>
+        <p:spPr bwMode="auto">
+          <a:xfrm>
+            <a:off x="152399" y="3352800"/>
+            <a:ext cx="4030607" cy="2362200"/>
+          </a:xfrm>
+          <a:prstGeom prst="rect">
+            <a:avLst/>
+          </a:prstGeom>
+          <a:noFill/>
+          <a:ln>
+            <a:noFill/>
+          </a:ln>
+          <a:extLst>
+            <a:ext uri="{909E8E84-426E-40DD-AFC4-6F175D3DCCD1}">
+              <a14:hiddenFill xmlns:a14="http://schemas.microsoft.com/office/drawing/2010/main">
+                <a:solidFill>
+                  <a:schemeClr val="accent1"/>
+                </a:solidFill>
+              </a14:hiddenFill>
+            </a:ext>
+            <a:ext uri="{91240B29-F687-4F45-9708-019B960494DF}">
+              <a14:hiddenLine xmlns:a14="http://schemas.microsoft.com/office/drawing/2010/main" w="9525">
+                <a:solidFill>
+                  <a:schemeClr val="tx1"/>
+                </a:solidFill>
+                <a:miter lim="800000"/>
+                <a:headEnd/>
+                <a:tailEnd/>
+              </a14:hiddenLine>
+            </a:ext>
+          </a:extLst>
+        </p:spPr>
+      </p:pic>
+      <p:pic>
+        <p:nvPicPr>
+          <p:cNvPr id="1030" name="Picture 6"/>
+          <p:cNvPicPr>
+            <a:picLocks noChangeAspect="1" noChangeArrowheads="1"/>
+          </p:cNvPicPr>
+          <p:nvPr/>
+        </p:nvPicPr>
+        <p:blipFill>
+          <a:blip r:embed="rId3">
+            <a:extLst>
+              <a:ext uri="{28A0092B-C50C-407E-A947-70E740481C1C}">
+                <a14:useLocalDpi xmlns:a14="http://schemas.microsoft.com/office/drawing/2010/main" val="0"/>
+              </a:ext>
+            </a:extLst>
+          </a:blip>
+          <a:srcRect/>
+          <a:stretch>
+            <a:fillRect/>
+          </a:stretch>
+        </p:blipFill>
+        <p:spPr bwMode="auto">
+          <a:xfrm>
+            <a:off x="4343400" y="3412067"/>
+            <a:ext cx="4647841" cy="2291644"/>
+          </a:xfrm>
+          <a:prstGeom prst="rect">
+            <a:avLst/>
+          </a:prstGeom>
+          <a:noFill/>
+          <a:ln>
+            <a:noFill/>
+          </a:ln>
+          <a:extLst>
+            <a:ext uri="{909E8E84-426E-40DD-AFC4-6F175D3DCCD1}">
+              <a14:hiddenFill xmlns:a14="http://schemas.microsoft.com/office/drawing/2010/main">
+                <a:solidFill>
+                  <a:schemeClr val="accent1"/>
+                </a:solidFill>
+              </a14:hiddenFill>
+            </a:ext>
+            <a:ext uri="{91240B29-F687-4F45-9708-019B960494DF}">
+              <a14:hiddenLine xmlns:a14="http://schemas.microsoft.com/office/drawing/2010/main" w="9525">
+                <a:solidFill>
+                  <a:schemeClr val="tx1"/>
+                </a:solidFill>
+                <a:miter lim="800000"/>
+                <a:headEnd/>
+                <a:tailEnd/>
+              </a14:hiddenLine>
+            </a:ext>
+          </a:extLst>
+        </p:spPr>
+      </p:pic>
+    </p:spTree>
+    <p:extLst>
+      <p:ext uri="{BB962C8B-B14F-4D97-AF65-F5344CB8AC3E}">
+        <p14:creationId xmlns:p14="http://schemas.microsoft.com/office/powerpoint/2010/main" val="2445650664"/>
+      </p:ext>
+    </p:extLst>
+  </p:cSld>
+  <p:clrMapOvr>
+    <a:masterClrMapping/>
+  </p:clrMapOvr>
+</p:sld>
+</file>
+
+<file path=ppt/slides/slide46.xml><?xml version="1.0" encoding="utf-8"?>
+<p:sld xmlns:a="http://schemas.openxmlformats.org/drawingml/2006/main" xmlns:r="http://schemas.openxmlformats.org/officeDocument/2006/relationships" xmlns:p="http://schemas.openxmlformats.org/presentationml/2006/main">
+  <p:cSld>
+    <p:spTree>
+      <p:nvGrpSpPr>
+        <p:cNvPr id="1" name=""/>
+        <p:cNvGrpSpPr/>
+        <p:nvPr/>
+      </p:nvGrpSpPr>
+      <p:grpSpPr>
+        <a:xfrm>
+          <a:off x="0" y="0"/>
+          <a:ext cx="0" cy="0"/>
+          <a:chOff x="0" y="0"/>
+          <a:chExt cx="0" cy="0"/>
+        </a:xfrm>
+      </p:grpSpPr>
+      <p:sp>
+        <p:nvSpPr>
+          <p:cNvPr id="2" name="Title 1"/>
+          <p:cNvSpPr>
+            <a:spLocks noGrp="1"/>
+          </p:cNvSpPr>
+          <p:nvPr>
+            <p:ph type="title"/>
+          </p:nvPr>
+        </p:nvSpPr>
+        <p:spPr>
+          <a:xfrm>
+            <a:off x="457200" y="-76200"/>
+            <a:ext cx="8229600" cy="825786"/>
+          </a:xfrm>
+        </p:spPr>
+        <p:txBody>
+          <a:bodyPr>
+            <a:normAutofit/>
+          </a:bodyPr>
+          <a:lstStyle/>
+          <a:p>
+            <a:r>
+              <a:rPr lang="en-US" dirty="0" smtClean="0"/>
+              <a:t>SQL!</a:t>
+            </a:r>
+            <a:endParaRPr lang="en-US" dirty="0"/>
+          </a:p>
+        </p:txBody>
+      </p:sp>
+      <p:sp>
+        <p:nvSpPr>
+          <p:cNvPr id="3" name="Content Placeholder 2"/>
+          <p:cNvSpPr>
+            <a:spLocks noGrp="1"/>
+          </p:cNvSpPr>
+          <p:nvPr>
+            <p:ph idx="1"/>
+          </p:nvPr>
+        </p:nvSpPr>
+        <p:spPr>
+          <a:xfrm>
+            <a:off x="152400" y="557676"/>
+            <a:ext cx="5410200" cy="1766424"/>
+          </a:xfrm>
+        </p:spPr>
+        <p:txBody>
+          <a:bodyPr>
+            <a:normAutofit/>
+          </a:bodyPr>
+          <a:lstStyle/>
+          <a:p>
+            <a:pPr marL="0" indent="0" algn="ctr">
+              <a:buNone/>
+            </a:pPr>
+            <a:r>
+              <a:rPr lang="en-US" dirty="0"/>
+              <a:t>Single line</a:t>
+            </a:r>
+          </a:p>
+          <a:p>
+            <a:pPr marL="0" indent="0">
+              <a:buNone/>
+            </a:pPr>
+            <a:r>
+              <a:rPr lang="en-US" dirty="0" err="1" smtClean="0"/>
+              <a:t>sqlite</a:t>
+            </a:r>
+            <a:r>
+              <a:rPr lang="en-US" dirty="0" smtClean="0"/>
+              <a:t>&gt; </a:t>
+            </a:r>
+            <a:r>
+              <a:rPr lang="en-US" b="1" dirty="0" smtClean="0">
+                <a:solidFill>
+                  <a:srgbClr val="7030A0"/>
+                </a:solidFill>
+              </a:rPr>
+              <a:t>SELECT * FROM Items;</a:t>
+            </a:r>
+          </a:p>
+          <a:p>
+            <a:pPr marL="0" indent="0">
+              <a:buNone/>
+            </a:pPr>
+            <a:r>
+              <a:rPr lang="en-US" dirty="0" smtClean="0"/>
+              <a:t> </a:t>
+            </a:r>
+            <a:endParaRPr lang="en-US" dirty="0"/>
+          </a:p>
+        </p:txBody>
+      </p:sp>
+      <p:pic>
+        <p:nvPicPr>
+          <p:cNvPr id="2050" name="Picture 2"/>
+          <p:cNvPicPr>
+            <a:picLocks noChangeAspect="1" noChangeArrowheads="1"/>
+          </p:cNvPicPr>
+          <p:nvPr/>
+        </p:nvPicPr>
+        <p:blipFill>
+          <a:blip r:embed="rId2">
+            <a:extLst>
+              <a:ext uri="{28A0092B-C50C-407E-A947-70E740481C1C}">
+                <a14:useLocalDpi xmlns:a14="http://schemas.microsoft.com/office/drawing/2010/main" val="0"/>
+              </a:ext>
+            </a:extLst>
+          </a:blip>
+          <a:srcRect/>
+          <a:stretch>
+            <a:fillRect/>
+          </a:stretch>
+        </p:blipFill>
+        <p:spPr bwMode="auto">
+          <a:xfrm>
+            <a:off x="366889" y="1981200"/>
+            <a:ext cx="4495800" cy="4495800"/>
+          </a:xfrm>
+          <a:prstGeom prst="rect">
+            <a:avLst/>
+          </a:prstGeom>
+          <a:noFill/>
+          <a:ln>
+            <a:noFill/>
+          </a:ln>
+          <a:extLst>
+            <a:ext uri="{909E8E84-426E-40DD-AFC4-6F175D3DCCD1}">
+              <a14:hiddenFill xmlns:a14="http://schemas.microsoft.com/office/drawing/2010/main">
+                <a:solidFill>
+                  <a:schemeClr val="accent1"/>
+                </a:solidFill>
+              </a14:hiddenFill>
+            </a:ext>
+            <a:ext uri="{91240B29-F687-4F45-9708-019B960494DF}">
+              <a14:hiddenLine xmlns:a14="http://schemas.microsoft.com/office/drawing/2010/main" w="9525">
+                <a:solidFill>
+                  <a:schemeClr val="tx1"/>
+                </a:solidFill>
+                <a:miter lim="800000"/>
+                <a:headEnd/>
+                <a:tailEnd/>
+              </a14:hiddenLine>
+            </a:ext>
+          </a:extLst>
+        </p:spPr>
+      </p:pic>
+      <p:sp>
+        <p:nvSpPr>
+          <p:cNvPr id="5" name="Content Placeholder 2"/>
+          <p:cNvSpPr txBox="1">
+            <a:spLocks/>
+          </p:cNvSpPr>
+          <p:nvPr/>
+        </p:nvSpPr>
+        <p:spPr>
+          <a:xfrm>
+            <a:off x="5401733" y="557676"/>
+            <a:ext cx="3429000" cy="3352800"/>
+          </a:xfrm>
+          <a:prstGeom prst="rect">
+            <a:avLst/>
+          </a:prstGeom>
+          <a:ln w="25400">
+            <a:solidFill>
+              <a:srgbClr val="0070C0"/>
+            </a:solidFill>
+            <a:prstDash val="sysDot"/>
+          </a:ln>
+        </p:spPr>
+        <p:txBody>
+          <a:bodyPr vert="horz" lIns="91440" tIns="45720" rIns="91440" bIns="45720" rtlCol="0">
+            <a:normAutofit/>
+          </a:bodyPr>
+          <a:lstStyle>
+            <a:lvl1pPr marL="342900" indent="-342900" algn="l" defTabSz="914400" rtl="0" eaLnBrk="1" latinLnBrk="0" hangingPunct="1">
+              <a:spcBef>
+                <a:spcPct val="20000"/>
+              </a:spcBef>
+              <a:buFont typeface="Arial" panose="020B0604020202020204" pitchFamily="34" charset="0"/>
+              <a:buChar char="•"/>
+              <a:defRPr sz="3200" kern="1200">
+                <a:solidFill>
+                  <a:schemeClr val="tx1"/>
+                </a:solidFill>
+                <a:latin typeface="+mn-lt"/>
+                <a:ea typeface="+mn-ea"/>
+                <a:cs typeface="+mn-cs"/>
+              </a:defRPr>
+            </a:lvl1pPr>
+            <a:lvl2pPr marL="742950" indent="-285750" algn="l" defTabSz="914400" rtl="0" eaLnBrk="1" latinLnBrk="0" hangingPunct="1">
+              <a:spcBef>
+                <a:spcPct val="20000"/>
+              </a:spcBef>
+              <a:buFont typeface="Arial" panose="020B0604020202020204" pitchFamily="34" charset="0"/>
+              <a:buChar char="–"/>
+              <a:defRPr sz="2800" kern="1200">
+                <a:solidFill>
+                  <a:schemeClr val="tx1"/>
+                </a:solidFill>
+                <a:latin typeface="+mn-lt"/>
+                <a:ea typeface="+mn-ea"/>
+                <a:cs typeface="+mn-cs"/>
+              </a:defRPr>
+            </a:lvl2pPr>
+            <a:lvl3pPr marL="1143000" indent="-228600" algn="l" defTabSz="914400" rtl="0" eaLnBrk="1" latinLnBrk="0" hangingPunct="1">
+              <a:spcBef>
+                <a:spcPct val="20000"/>
+              </a:spcBef>
+              <a:buFont typeface="Arial" panose="020B0604020202020204" pitchFamily="34" charset="0"/>
+              <a:buChar char="•"/>
+              <a:defRPr sz="2400" kern="1200">
+                <a:solidFill>
+                  <a:schemeClr val="tx1"/>
+                </a:solidFill>
+                <a:latin typeface="+mn-lt"/>
+                <a:ea typeface="+mn-ea"/>
+                <a:cs typeface="+mn-cs"/>
+              </a:defRPr>
+            </a:lvl3pPr>
+            <a:lvl4pPr marL="1600200" indent="-228600" algn="l" defTabSz="914400" rtl="0" eaLnBrk="1" latinLnBrk="0" hangingPunct="1">
+              <a:spcBef>
+                <a:spcPct val="20000"/>
+              </a:spcBef>
+              <a:buFont typeface="Arial" panose="020B0604020202020204" pitchFamily="34" charset="0"/>
+              <a:buChar char="–"/>
+              <a:defRPr sz="2000" kern="1200">
+                <a:solidFill>
+                  <a:schemeClr val="tx1"/>
+                </a:solidFill>
+                <a:latin typeface="+mn-lt"/>
+                <a:ea typeface="+mn-ea"/>
+                <a:cs typeface="+mn-cs"/>
+              </a:defRPr>
+            </a:lvl4pPr>
+            <a:lvl5pPr marL="2057400" indent="-228600" algn="l" defTabSz="914400" rtl="0" eaLnBrk="1" latinLnBrk="0" hangingPunct="1">
+              <a:spcBef>
+                <a:spcPct val="20000"/>
+              </a:spcBef>
+              <a:buFont typeface="Arial" panose="020B0604020202020204" pitchFamily="34" charset="0"/>
+              <a:buChar char="»"/>
+              <a:defRPr sz="2000" kern="1200">
+                <a:solidFill>
+                  <a:schemeClr val="tx1"/>
+                </a:solidFill>
+                <a:latin typeface="+mn-lt"/>
+                <a:ea typeface="+mn-ea"/>
+                <a:cs typeface="+mn-cs"/>
+              </a:defRPr>
+            </a:lvl5pPr>
+            <a:lvl6pPr marL="2514600" indent="-228600" algn="l" defTabSz="914400" rtl="0" eaLnBrk="1" latinLnBrk="0" hangingPunct="1">
+              <a:spcBef>
+                <a:spcPct val="20000"/>
+              </a:spcBef>
+              <a:buFont typeface="Arial" panose="020B0604020202020204" pitchFamily="34" charset="0"/>
+              <a:buChar char="•"/>
+              <a:defRPr sz="2000" kern="1200">
+                <a:solidFill>
+                  <a:schemeClr val="tx1"/>
+                </a:solidFill>
+                <a:latin typeface="+mn-lt"/>
+                <a:ea typeface="+mn-ea"/>
+                <a:cs typeface="+mn-cs"/>
+              </a:defRPr>
+            </a:lvl6pPr>
+            <a:lvl7pPr marL="2971800" indent="-228600" algn="l" defTabSz="914400" rtl="0" eaLnBrk="1" latinLnBrk="0" hangingPunct="1">
+              <a:spcBef>
+                <a:spcPct val="20000"/>
+              </a:spcBef>
+              <a:buFont typeface="Arial" panose="020B0604020202020204" pitchFamily="34" charset="0"/>
+              <a:buChar char="•"/>
+              <a:defRPr sz="2000" kern="1200">
+                <a:solidFill>
+                  <a:schemeClr val="tx1"/>
+                </a:solidFill>
+                <a:latin typeface="+mn-lt"/>
+                <a:ea typeface="+mn-ea"/>
+                <a:cs typeface="+mn-cs"/>
+              </a:defRPr>
+            </a:lvl7pPr>
+            <a:lvl8pPr marL="3429000" indent="-228600" algn="l" defTabSz="914400" rtl="0" eaLnBrk="1" latinLnBrk="0" hangingPunct="1">
+              <a:spcBef>
+                <a:spcPct val="20000"/>
+              </a:spcBef>
+              <a:buFont typeface="Arial" panose="020B0604020202020204" pitchFamily="34" charset="0"/>
+              <a:buChar char="•"/>
+              <a:defRPr sz="2000" kern="1200">
+                <a:solidFill>
+                  <a:schemeClr val="tx1"/>
+                </a:solidFill>
+                <a:latin typeface="+mn-lt"/>
+                <a:ea typeface="+mn-ea"/>
+                <a:cs typeface="+mn-cs"/>
+              </a:defRPr>
+            </a:lvl8pPr>
+            <a:lvl9pPr marL="3886200" indent="-228600" algn="l" defTabSz="914400" rtl="0" eaLnBrk="1" latinLnBrk="0" hangingPunct="1">
+              <a:spcBef>
+                <a:spcPct val="20000"/>
+              </a:spcBef>
+              <a:buFont typeface="Arial" panose="020B0604020202020204" pitchFamily="34" charset="0"/>
+              <a:buChar char="•"/>
+              <a:defRPr sz="2000" kern="1200">
+                <a:solidFill>
+                  <a:schemeClr val="tx1"/>
+                </a:solidFill>
+                <a:latin typeface="+mn-lt"/>
+                <a:ea typeface="+mn-ea"/>
+                <a:cs typeface="+mn-cs"/>
+              </a:defRPr>
+            </a:lvl9pPr>
+          </a:lstStyle>
+          <a:p>
+            <a:pPr marL="0" indent="0" algn="ctr">
+              <a:buNone/>
+            </a:pPr>
+            <a:r>
+              <a:rPr lang="en-US" dirty="0"/>
+              <a:t>Multi-line</a:t>
+            </a:r>
+          </a:p>
+          <a:p>
+            <a:pPr marL="0" indent="0">
+              <a:buFont typeface="Arial" panose="020B0604020202020204" pitchFamily="34" charset="0"/>
+              <a:buNone/>
+            </a:pPr>
+            <a:r>
+              <a:rPr lang="en-US" dirty="0" err="1" smtClean="0"/>
+              <a:t>sqlite</a:t>
+            </a:r>
+            <a:r>
+              <a:rPr lang="en-US" dirty="0" smtClean="0"/>
+              <a:t>&gt; </a:t>
+            </a:r>
+            <a:r>
+              <a:rPr lang="en-US" b="1" dirty="0" smtClean="0">
+                <a:solidFill>
+                  <a:srgbClr val="7030A0"/>
+                </a:solidFill>
+              </a:rPr>
+              <a:t>SELECT * </a:t>
+            </a:r>
+          </a:p>
+          <a:p>
+            <a:pPr marL="0" indent="0">
+              <a:buNone/>
+            </a:pPr>
+            <a:r>
+              <a:rPr lang="en-US" dirty="0" smtClean="0"/>
+              <a:t>      …&gt; </a:t>
+            </a:r>
+            <a:r>
+              <a:rPr lang="en-US" b="1" dirty="0" smtClean="0">
+                <a:solidFill>
+                  <a:srgbClr val="7030A0"/>
+                </a:solidFill>
+              </a:rPr>
+              <a:t>FROM Items</a:t>
+            </a:r>
+          </a:p>
+          <a:p>
+            <a:pPr marL="0" indent="0">
+              <a:buNone/>
+            </a:pPr>
+            <a:r>
+              <a:rPr lang="en-US" dirty="0"/>
+              <a:t> </a:t>
+            </a:r>
+            <a:r>
+              <a:rPr lang="en-US" dirty="0" smtClean="0"/>
+              <a:t>     …&gt; </a:t>
+            </a:r>
+            <a:r>
+              <a:rPr lang="en-US" b="1" dirty="0" smtClean="0">
+                <a:solidFill>
+                  <a:srgbClr val="7030A0"/>
+                </a:solidFill>
+              </a:rPr>
+              <a:t>;</a:t>
+            </a:r>
+          </a:p>
+          <a:p>
+            <a:pPr marL="0" indent="0">
+              <a:buFont typeface="Arial" panose="020B0604020202020204" pitchFamily="34" charset="0"/>
+              <a:buNone/>
+            </a:pPr>
+            <a:r>
+              <a:rPr lang="en-US" dirty="0" smtClean="0"/>
+              <a:t> </a:t>
+            </a:r>
+            <a:endParaRPr lang="en-US" dirty="0"/>
+          </a:p>
+        </p:txBody>
+      </p:sp>
+      <p:cxnSp>
+        <p:nvCxnSpPr>
+          <p:cNvPr id="8" name="Straight Connector 7"/>
+          <p:cNvCxnSpPr/>
+          <p:nvPr/>
+        </p:nvCxnSpPr>
+        <p:spPr>
+          <a:xfrm>
+            <a:off x="228600" y="1143000"/>
+            <a:ext cx="4800600" cy="0"/>
+          </a:xfrm>
+          <a:prstGeom prst="line">
+            <a:avLst/>
+          </a:prstGeom>
+          <a:ln w="19050">
+            <a:solidFill>
+              <a:schemeClr val="tx1"/>
+            </a:solidFill>
+          </a:ln>
+        </p:spPr>
+        <p:style>
+          <a:lnRef idx="1">
+            <a:schemeClr val="accent1"/>
+          </a:lnRef>
+          <a:fillRef idx="0">
+            <a:schemeClr val="accent1"/>
+          </a:fillRef>
+          <a:effectRef idx="0">
+            <a:schemeClr val="accent1"/>
+          </a:effectRef>
+          <a:fontRef idx="minor">
+            <a:schemeClr val="tx1"/>
+          </a:fontRef>
+        </p:style>
+      </p:cxnSp>
+      <p:cxnSp>
+        <p:nvCxnSpPr>
+          <p:cNvPr id="10" name="Straight Connector 9"/>
+          <p:cNvCxnSpPr/>
+          <p:nvPr/>
+        </p:nvCxnSpPr>
+        <p:spPr>
+          <a:xfrm>
+            <a:off x="5475111" y="1143000"/>
+            <a:ext cx="3211689" cy="0"/>
+          </a:xfrm>
+          <a:prstGeom prst="line">
+            <a:avLst/>
+          </a:prstGeom>
+          <a:ln w="19050">
+            <a:solidFill>
+              <a:schemeClr val="tx1"/>
+            </a:solidFill>
+          </a:ln>
+        </p:spPr>
+        <p:style>
+          <a:lnRef idx="1">
+            <a:schemeClr val="accent1"/>
+          </a:lnRef>
+          <a:fillRef idx="0">
+            <a:schemeClr val="accent1"/>
+          </a:fillRef>
+          <a:effectRef idx="0">
+            <a:schemeClr val="accent1"/>
+          </a:effectRef>
+          <a:fontRef idx="minor">
+            <a:schemeClr val="tx1"/>
+          </a:fontRef>
+        </p:style>
+      </p:cxnSp>
+    </p:spTree>
+    <p:extLst>
+      <p:ext uri="{BB962C8B-B14F-4D97-AF65-F5344CB8AC3E}">
+        <p14:creationId xmlns:p14="http://schemas.microsoft.com/office/powerpoint/2010/main" val="3256457589"/>
+      </p:ext>
+    </p:extLst>
+  </p:cSld>
+  <p:clrMapOvr>
+    <a:masterClrMapping/>
+  </p:clrMapOvr>
+</p:sld>
+</file>
+
+<file path=ppt/slides/slide47.xml><?xml version="1.0" encoding="utf-8"?>
+<p:sld xmlns:a="http://schemas.openxmlformats.org/drawingml/2006/main" xmlns:r="http://schemas.openxmlformats.org/officeDocument/2006/relationships" xmlns:p="http://schemas.openxmlformats.org/presentationml/2006/main">
+  <p:cSld>
+    <p:spTree>
+      <p:nvGrpSpPr>
+        <p:cNvPr id="1" name=""/>
+        <p:cNvGrpSpPr/>
+        <p:nvPr/>
+      </p:nvGrpSpPr>
+      <p:grpSpPr>
+        <a:xfrm>
+          <a:off x="0" y="0"/>
+          <a:ext cx="0" cy="0"/>
+          <a:chOff x="0" y="0"/>
+          <a:chExt cx="0" cy="0"/>
+        </a:xfrm>
+      </p:grpSpPr>
+      <p:sp>
+        <p:nvSpPr>
+          <p:cNvPr id="2" name="Title 1"/>
+          <p:cNvSpPr>
+            <a:spLocks noGrp="1"/>
+          </p:cNvSpPr>
+          <p:nvPr>
+            <p:ph type="title"/>
+          </p:nvPr>
+        </p:nvSpPr>
+        <p:spPr>
+          <a:xfrm>
+            <a:off x="457200" y="0"/>
+            <a:ext cx="8229600" cy="1143000"/>
+          </a:xfrm>
+        </p:spPr>
+        <p:txBody>
+          <a:bodyPr/>
+          <a:lstStyle/>
+          <a:p>
+            <a:r>
+              <a:rPr lang="en-US" dirty="0" smtClean="0"/>
+              <a:t>Where</a:t>
+            </a:r>
+            <a:endParaRPr lang="en-US" dirty="0"/>
+          </a:p>
+        </p:txBody>
+      </p:sp>
+      <p:sp>
+        <p:nvSpPr>
+          <p:cNvPr id="3" name="Content Placeholder 2"/>
+          <p:cNvSpPr>
+            <a:spLocks noGrp="1"/>
+          </p:cNvSpPr>
+          <p:nvPr>
+            <p:ph idx="1"/>
+          </p:nvPr>
+        </p:nvSpPr>
+        <p:spPr>
+          <a:xfrm>
+            <a:off x="381000" y="914400"/>
+            <a:ext cx="8229600" cy="4525963"/>
+          </a:xfrm>
+        </p:spPr>
+        <p:txBody>
+          <a:bodyPr/>
+          <a:lstStyle/>
+          <a:p>
+            <a:pPr marL="0" indent="0">
+              <a:buNone/>
+            </a:pPr>
+            <a:r>
+              <a:rPr lang="en-US" dirty="0" err="1"/>
+              <a:t>sqlite</a:t>
+            </a:r>
+            <a:r>
+              <a:rPr lang="en-US" dirty="0"/>
+              <a:t>&gt; </a:t>
+            </a:r>
+            <a:r>
+              <a:rPr lang="en-US" b="1" dirty="0">
+                <a:solidFill>
+                  <a:srgbClr val="7030A0"/>
+                </a:solidFill>
+              </a:rPr>
+              <a:t>SELECT * </a:t>
+            </a:r>
+            <a:r>
+              <a:rPr lang="en-US" b="1" dirty="0" smtClean="0">
+                <a:solidFill>
+                  <a:srgbClr val="7030A0"/>
+                </a:solidFill>
+              </a:rPr>
+              <a:t>FROM </a:t>
+            </a:r>
+            <a:r>
+              <a:rPr lang="en-US" b="1" dirty="0">
+                <a:solidFill>
+                  <a:srgbClr val="7030A0"/>
+                </a:solidFill>
+              </a:rPr>
+              <a:t>Items</a:t>
+            </a:r>
+          </a:p>
+          <a:p>
+            <a:pPr marL="0" indent="0">
+              <a:buNone/>
+            </a:pPr>
+            <a:r>
+              <a:rPr lang="en-US" dirty="0"/>
+              <a:t>      …&gt; </a:t>
+            </a:r>
+            <a:r>
+              <a:rPr lang="en-US" b="1" dirty="0" smtClean="0">
+                <a:solidFill>
+                  <a:srgbClr val="7030A0"/>
+                </a:solidFill>
+              </a:rPr>
+              <a:t>WHERE Item = ‘books’;</a:t>
+            </a:r>
+            <a:endParaRPr lang="en-US" b="1" dirty="0">
+              <a:solidFill>
+                <a:srgbClr val="7030A0"/>
+              </a:solidFill>
+            </a:endParaRPr>
+          </a:p>
+        </p:txBody>
+      </p:sp>
+      <p:pic>
+        <p:nvPicPr>
+          <p:cNvPr id="3074" name="Picture 2"/>
+          <p:cNvPicPr>
+            <a:picLocks noChangeAspect="1" noChangeArrowheads="1"/>
+          </p:cNvPicPr>
+          <p:nvPr/>
+        </p:nvPicPr>
+        <p:blipFill>
+          <a:blip r:embed="rId2">
+            <a:extLst>
+              <a:ext uri="{28A0092B-C50C-407E-A947-70E740481C1C}">
+                <a14:useLocalDpi xmlns:a14="http://schemas.microsoft.com/office/drawing/2010/main" val="0"/>
+              </a:ext>
+            </a:extLst>
+          </a:blip>
+          <a:srcRect/>
+          <a:stretch>
+            <a:fillRect/>
+          </a:stretch>
+        </p:blipFill>
+        <p:spPr bwMode="auto">
+          <a:xfrm>
+            <a:off x="533400" y="2362200"/>
+            <a:ext cx="5791200" cy="2563693"/>
+          </a:xfrm>
+          <a:prstGeom prst="rect">
+            <a:avLst/>
+          </a:prstGeom>
+          <a:noFill/>
+          <a:ln>
+            <a:noFill/>
+          </a:ln>
+          <a:extLst>
+            <a:ext uri="{909E8E84-426E-40DD-AFC4-6F175D3DCCD1}">
+              <a14:hiddenFill xmlns:a14="http://schemas.microsoft.com/office/drawing/2010/main">
+                <a:solidFill>
+                  <a:schemeClr val="accent1"/>
+                </a:solidFill>
+              </a14:hiddenFill>
+            </a:ext>
+            <a:ext uri="{91240B29-F687-4F45-9708-019B960494DF}">
+              <a14:hiddenLine xmlns:a14="http://schemas.microsoft.com/office/drawing/2010/main" w="9525">
+                <a:solidFill>
+                  <a:schemeClr val="tx1"/>
+                </a:solidFill>
+                <a:miter lim="800000"/>
+                <a:headEnd/>
+                <a:tailEnd/>
+              </a14:hiddenLine>
+            </a:ext>
+          </a:extLst>
+        </p:spPr>
+      </p:pic>
+    </p:spTree>
+    <p:extLst>
+      <p:ext uri="{BB962C8B-B14F-4D97-AF65-F5344CB8AC3E}">
+        <p14:creationId xmlns:p14="http://schemas.microsoft.com/office/powerpoint/2010/main" val="3943303359"/>
+      </p:ext>
+    </p:extLst>
+  </p:cSld>
+  <p:clrMapOvr>
+    <a:masterClrMapping/>
+  </p:clrMapOvr>
+</p:sld>
+</file>
+
+<file path=ppt/slides/slide48.xml><?xml version="1.0" encoding="utf-8"?>
+<p:sld xmlns:a="http://schemas.openxmlformats.org/drawingml/2006/main" xmlns:r="http://schemas.openxmlformats.org/officeDocument/2006/relationships" xmlns:p="http://schemas.openxmlformats.org/presentationml/2006/main">
+  <p:cSld>
+    <p:spTree>
+      <p:nvGrpSpPr>
+        <p:cNvPr id="1" name=""/>
+        <p:cNvGrpSpPr/>
+        <p:nvPr/>
+      </p:nvGrpSpPr>
+      <p:grpSpPr>
+        <a:xfrm>
+          <a:off x="0" y="0"/>
+          <a:ext cx="0" cy="0"/>
+          <a:chOff x="0" y="0"/>
+          <a:chExt cx="0" cy="0"/>
+        </a:xfrm>
+      </p:grpSpPr>
+      <p:sp>
+        <p:nvSpPr>
+          <p:cNvPr id="2" name="Title 1"/>
+          <p:cNvSpPr>
+            <a:spLocks noGrp="1"/>
+          </p:cNvSpPr>
+          <p:nvPr>
+            <p:ph type="title"/>
+          </p:nvPr>
+        </p:nvSpPr>
+        <p:spPr>
+          <a:xfrm>
+            <a:off x="457200" y="0"/>
+            <a:ext cx="8229600" cy="1143000"/>
+          </a:xfrm>
+        </p:spPr>
+        <p:txBody>
+          <a:bodyPr/>
+          <a:lstStyle/>
+          <a:p>
+            <a:r>
+              <a:rPr lang="en-US" dirty="0" smtClean="0"/>
+              <a:t>Where</a:t>
+            </a:r>
+            <a:endParaRPr lang="en-US" dirty="0"/>
+          </a:p>
+        </p:txBody>
+      </p:sp>
+      <p:sp>
+        <p:nvSpPr>
+          <p:cNvPr id="3" name="Content Placeholder 2"/>
+          <p:cNvSpPr>
+            <a:spLocks noGrp="1"/>
+          </p:cNvSpPr>
+          <p:nvPr>
+            <p:ph idx="1"/>
+          </p:nvPr>
+        </p:nvSpPr>
+        <p:spPr>
+          <a:xfrm>
+            <a:off x="381000" y="914400"/>
+            <a:ext cx="8229600" cy="4525963"/>
+          </a:xfrm>
+        </p:spPr>
+        <p:txBody>
+          <a:bodyPr/>
+          <a:lstStyle/>
+          <a:p>
+            <a:pPr marL="0" indent="0">
+              <a:buNone/>
+            </a:pPr>
+            <a:r>
+              <a:rPr lang="en-US" dirty="0" err="1"/>
+              <a:t>sqlite</a:t>
+            </a:r>
+            <a:r>
+              <a:rPr lang="en-US" dirty="0"/>
+              <a:t>&gt; </a:t>
+            </a:r>
+            <a:r>
+              <a:rPr lang="en-US" b="1" dirty="0">
+                <a:solidFill>
+                  <a:srgbClr val="7030A0"/>
+                </a:solidFill>
+              </a:rPr>
+              <a:t>SELECT * </a:t>
+            </a:r>
+            <a:r>
+              <a:rPr lang="en-US" b="1" dirty="0" smtClean="0">
+                <a:solidFill>
+                  <a:srgbClr val="7030A0"/>
+                </a:solidFill>
+              </a:rPr>
+              <a:t>FROM </a:t>
+            </a:r>
+            <a:r>
+              <a:rPr lang="en-US" b="1" dirty="0">
+                <a:solidFill>
+                  <a:srgbClr val="7030A0"/>
+                </a:solidFill>
+              </a:rPr>
+              <a:t>Items</a:t>
+            </a:r>
+          </a:p>
+          <a:p>
+            <a:pPr marL="0" indent="0">
+              <a:buNone/>
+            </a:pPr>
+            <a:r>
+              <a:rPr lang="en-US" dirty="0"/>
+              <a:t>      …&gt; </a:t>
+            </a:r>
+            <a:r>
+              <a:rPr lang="en-US" b="1" dirty="0" smtClean="0">
+                <a:solidFill>
+                  <a:srgbClr val="7030A0"/>
+                </a:solidFill>
+              </a:rPr>
+              <a:t>WHERE </a:t>
+            </a:r>
+            <a:r>
+              <a:rPr lang="en-US" b="1" dirty="0" err="1" smtClean="0">
+                <a:solidFill>
+                  <a:srgbClr val="7030A0"/>
+                </a:solidFill>
+              </a:rPr>
+              <a:t>ItemID</a:t>
+            </a:r>
+            <a:r>
+              <a:rPr lang="en-US" b="1" dirty="0" smtClean="0">
+                <a:solidFill>
+                  <a:srgbClr val="7030A0"/>
+                </a:solidFill>
+              </a:rPr>
+              <a:t> &gt;= 4;</a:t>
+            </a:r>
+            <a:endParaRPr lang="en-US" b="1" dirty="0">
+              <a:solidFill>
+                <a:srgbClr val="7030A0"/>
+              </a:solidFill>
+            </a:endParaRPr>
+          </a:p>
+        </p:txBody>
+      </p:sp>
+      <p:pic>
+        <p:nvPicPr>
+          <p:cNvPr id="4098" name="Picture 2"/>
+          <p:cNvPicPr>
+            <a:picLocks noChangeAspect="1" noChangeArrowheads="1"/>
+          </p:cNvPicPr>
+          <p:nvPr/>
+        </p:nvPicPr>
+        <p:blipFill>
+          <a:blip r:embed="rId2">
+            <a:extLst>
+              <a:ext uri="{28A0092B-C50C-407E-A947-70E740481C1C}">
+                <a14:useLocalDpi xmlns:a14="http://schemas.microsoft.com/office/drawing/2010/main" val="0"/>
+              </a:ext>
+            </a:extLst>
+          </a:blip>
+          <a:srcRect/>
+          <a:stretch>
+            <a:fillRect/>
+          </a:stretch>
+        </p:blipFill>
+        <p:spPr bwMode="auto">
+          <a:xfrm>
+            <a:off x="609600" y="2132366"/>
+            <a:ext cx="5029200" cy="4520172"/>
+          </a:xfrm>
+          <a:prstGeom prst="rect">
+            <a:avLst/>
+          </a:prstGeom>
+          <a:noFill/>
+          <a:ln>
+            <a:noFill/>
+          </a:ln>
+          <a:extLst>
+            <a:ext uri="{909E8E84-426E-40DD-AFC4-6F175D3DCCD1}">
+              <a14:hiddenFill xmlns:a14="http://schemas.microsoft.com/office/drawing/2010/main">
+                <a:solidFill>
+                  <a:schemeClr val="accent1"/>
+                </a:solidFill>
+              </a14:hiddenFill>
+            </a:ext>
+            <a:ext uri="{91240B29-F687-4F45-9708-019B960494DF}">
+              <a14:hiddenLine xmlns:a14="http://schemas.microsoft.com/office/drawing/2010/main" w="9525">
+                <a:solidFill>
+                  <a:schemeClr val="tx1"/>
+                </a:solidFill>
+                <a:miter lim="800000"/>
+                <a:headEnd/>
+                <a:tailEnd/>
+              </a14:hiddenLine>
+            </a:ext>
+          </a:extLst>
+        </p:spPr>
+      </p:pic>
+    </p:spTree>
+    <p:extLst>
+      <p:ext uri="{BB962C8B-B14F-4D97-AF65-F5344CB8AC3E}">
+        <p14:creationId xmlns:p14="http://schemas.microsoft.com/office/powerpoint/2010/main" val="824748587"/>
+      </p:ext>
+    </p:extLst>
+  </p:cSld>
+  <p:clrMapOvr>
+    <a:masterClrMapping/>
+  </p:clrMapOvr>
+</p:sld>
+</file>
+
+<file path=ppt/slides/slide49.xml><?xml version="1.0" encoding="utf-8"?>
+<p:sld xmlns:a="http://schemas.openxmlformats.org/drawingml/2006/main" xmlns:r="http://schemas.openxmlformats.org/officeDocument/2006/relationships" xmlns:p="http://schemas.openxmlformats.org/presentationml/2006/main">
+  <p:cSld>
+    <p:spTree>
+      <p:nvGrpSpPr>
+        <p:cNvPr id="1" name=""/>
+        <p:cNvGrpSpPr/>
+        <p:nvPr/>
+      </p:nvGrpSpPr>
+      <p:grpSpPr>
+        <a:xfrm>
+          <a:off x="0" y="0"/>
+          <a:ext cx="0" cy="0"/>
+          <a:chOff x="0" y="0"/>
+          <a:chExt cx="0" cy="0"/>
+        </a:xfrm>
+      </p:grpSpPr>
+      <p:sp>
+        <p:nvSpPr>
+          <p:cNvPr id="2" name="Title 1"/>
+          <p:cNvSpPr>
+            <a:spLocks noGrp="1"/>
+          </p:cNvSpPr>
+          <p:nvPr>
+            <p:ph type="title"/>
+          </p:nvPr>
+        </p:nvSpPr>
+        <p:spPr>
+          <a:xfrm>
+            <a:off x="457200" y="0"/>
+            <a:ext cx="8229600" cy="1143000"/>
+          </a:xfrm>
+        </p:spPr>
+        <p:txBody>
+          <a:bodyPr/>
+          <a:lstStyle/>
+          <a:p>
+            <a:r>
+              <a:rPr lang="en-US" dirty="0" smtClean="0"/>
+              <a:t>Where</a:t>
+            </a:r>
+            <a:endParaRPr lang="en-US" dirty="0"/>
+          </a:p>
+        </p:txBody>
+      </p:sp>
+      <p:sp>
+        <p:nvSpPr>
+          <p:cNvPr id="3" name="Content Placeholder 2"/>
+          <p:cNvSpPr>
+            <a:spLocks noGrp="1"/>
+          </p:cNvSpPr>
+          <p:nvPr>
+            <p:ph idx="1"/>
+          </p:nvPr>
+        </p:nvSpPr>
+        <p:spPr>
+          <a:xfrm>
+            <a:off x="381000" y="914400"/>
+            <a:ext cx="8229600" cy="4525963"/>
+          </a:xfrm>
+        </p:spPr>
+        <p:txBody>
+          <a:bodyPr/>
+          <a:lstStyle/>
+          <a:p>
+            <a:pPr marL="0" indent="0">
+              <a:buNone/>
+            </a:pPr>
+            <a:r>
+              <a:rPr lang="en-US" dirty="0" err="1"/>
+              <a:t>sqlite</a:t>
+            </a:r>
+            <a:r>
+              <a:rPr lang="en-US" dirty="0"/>
+              <a:t>&gt; </a:t>
+            </a:r>
+            <a:r>
+              <a:rPr lang="en-US" b="1" dirty="0">
+                <a:solidFill>
+                  <a:srgbClr val="7030A0"/>
+                </a:solidFill>
+              </a:rPr>
+              <a:t>SELECT * </a:t>
+            </a:r>
+            <a:r>
+              <a:rPr lang="en-US" b="1" dirty="0" smtClean="0">
+                <a:solidFill>
+                  <a:srgbClr val="7030A0"/>
+                </a:solidFill>
+              </a:rPr>
+              <a:t>FROM </a:t>
+            </a:r>
+            <a:r>
+              <a:rPr lang="en-US" b="1" dirty="0">
+                <a:solidFill>
+                  <a:srgbClr val="7030A0"/>
+                </a:solidFill>
+              </a:rPr>
+              <a:t>Items</a:t>
+            </a:r>
+          </a:p>
+          <a:p>
+            <a:pPr marL="0" indent="0">
+              <a:buNone/>
+            </a:pPr>
+            <a:r>
+              <a:rPr lang="en-US" dirty="0"/>
+              <a:t>      …&gt; </a:t>
+            </a:r>
+            <a:r>
+              <a:rPr lang="en-US" b="1" dirty="0" smtClean="0">
+                <a:solidFill>
+                  <a:srgbClr val="7030A0"/>
+                </a:solidFill>
+              </a:rPr>
+              <a:t>WHERE Item like ‘t%’;</a:t>
+            </a:r>
+            <a:endParaRPr lang="en-US" b="1" dirty="0">
+              <a:solidFill>
+                <a:srgbClr val="7030A0"/>
+              </a:solidFill>
+            </a:endParaRPr>
+          </a:p>
+        </p:txBody>
+      </p:sp>
+      <p:pic>
+        <p:nvPicPr>
+          <p:cNvPr id="5122" name="Picture 2"/>
+          <p:cNvPicPr>
+            <a:picLocks noChangeAspect="1" noChangeArrowheads="1"/>
+          </p:cNvPicPr>
+          <p:nvPr/>
+        </p:nvPicPr>
+        <p:blipFill>
+          <a:blip r:embed="rId2">
+            <a:extLst>
+              <a:ext uri="{28A0092B-C50C-407E-A947-70E740481C1C}">
+                <a14:useLocalDpi xmlns:a14="http://schemas.microsoft.com/office/drawing/2010/main" val="0"/>
+              </a:ext>
+            </a:extLst>
+          </a:blip>
+          <a:srcRect/>
+          <a:stretch>
+            <a:fillRect/>
+          </a:stretch>
+        </p:blipFill>
+        <p:spPr bwMode="auto">
+          <a:xfrm>
+            <a:off x="381000" y="2133600"/>
+            <a:ext cx="6019800" cy="2794907"/>
+          </a:xfrm>
+          <a:prstGeom prst="rect">
+            <a:avLst/>
+          </a:prstGeom>
+          <a:noFill/>
+          <a:ln>
+            <a:noFill/>
+          </a:ln>
+          <a:extLst>
+            <a:ext uri="{909E8E84-426E-40DD-AFC4-6F175D3DCCD1}">
+              <a14:hiddenFill xmlns:a14="http://schemas.microsoft.com/office/drawing/2010/main">
+                <a:solidFill>
+                  <a:schemeClr val="accent1"/>
+                </a:solidFill>
+              </a14:hiddenFill>
+            </a:ext>
+            <a:ext uri="{91240B29-F687-4F45-9708-019B960494DF}">
+              <a14:hiddenLine xmlns:a14="http://schemas.microsoft.com/office/drawing/2010/main" w="9525">
+                <a:solidFill>
+                  <a:schemeClr val="tx1"/>
+                </a:solidFill>
+                <a:miter lim="800000"/>
+                <a:headEnd/>
+                <a:tailEnd/>
+              </a14:hiddenLine>
+            </a:ext>
+          </a:extLst>
+        </p:spPr>
+      </p:pic>
+      <p:sp>
+        <p:nvSpPr>
+          <p:cNvPr id="4" name="TextBox 3"/>
+          <p:cNvSpPr txBox="1"/>
+          <p:nvPr/>
+        </p:nvSpPr>
+        <p:spPr>
+          <a:xfrm>
+            <a:off x="6400800" y="1066800"/>
+            <a:ext cx="2590800" cy="1938992"/>
+          </a:xfrm>
+          <a:prstGeom prst="rect">
+            <a:avLst/>
+          </a:prstGeom>
+          <a:noFill/>
+          <a:ln w="19050">
+            <a:solidFill>
+              <a:srgbClr val="0070C0"/>
+            </a:solidFill>
+            <a:prstDash val="sysDot"/>
+          </a:ln>
+        </p:spPr>
+        <p:txBody>
+          <a:bodyPr wrap="square" rtlCol="0">
+            <a:spAutoFit/>
+          </a:bodyPr>
+          <a:lstStyle/>
+          <a:p>
+            <a:r>
+              <a:rPr lang="en-US" sz="2400" dirty="0" smtClean="0">
+                <a:solidFill>
+                  <a:srgbClr val="0070C0"/>
+                </a:solidFill>
+              </a:rPr>
+              <a:t>% is a wildcard</a:t>
+            </a:r>
+          </a:p>
+          <a:p>
+            <a:r>
+              <a:rPr lang="en-US" sz="2400" dirty="0" smtClean="0">
+                <a:solidFill>
+                  <a:srgbClr val="0070C0"/>
+                </a:solidFill>
+              </a:rPr>
+              <a:t>‘t%’ – starts with ‘t’</a:t>
+            </a:r>
+          </a:p>
+          <a:p>
+            <a:r>
+              <a:rPr lang="en-US" sz="2400" dirty="0" smtClean="0">
+                <a:solidFill>
+                  <a:srgbClr val="0070C0"/>
+                </a:solidFill>
+              </a:rPr>
+              <a:t>‘%t’ – ends with ‘t’</a:t>
+            </a:r>
+          </a:p>
+          <a:p>
+            <a:r>
+              <a:rPr lang="en-US" sz="2400" dirty="0" smtClean="0">
+                <a:solidFill>
+                  <a:srgbClr val="0070C0"/>
+                </a:solidFill>
+              </a:rPr>
+              <a:t>‘%t% - has a ‘t’ </a:t>
+            </a:r>
+          </a:p>
+          <a:p>
+            <a:r>
+              <a:rPr lang="en-US" sz="2400" dirty="0" smtClean="0">
+                <a:solidFill>
+                  <a:srgbClr val="0070C0"/>
+                </a:solidFill>
+              </a:rPr>
+              <a:t>somewhere</a:t>
+            </a:r>
+            <a:endParaRPr lang="en-US" sz="2400" dirty="0">
+              <a:solidFill>
+                <a:srgbClr val="0070C0"/>
+              </a:solidFill>
+            </a:endParaRPr>
+          </a:p>
+        </p:txBody>
+      </p:sp>
+    </p:spTree>
+    <p:extLst>
+      <p:ext uri="{BB962C8B-B14F-4D97-AF65-F5344CB8AC3E}">
+        <p14:creationId xmlns:p14="http://schemas.microsoft.com/office/powerpoint/2010/main" val="3925295273"/>
+      </p:ext>
+    </p:extLst>
+  </p:cSld>
+  <p:clrMapOvr>
+    <a:masterClrMapping/>
+  </p:clrMapOvr>
 </p:sld>
 </file>
 

</xml_diff>